<commit_message>
Updated Intro and Game of UG
</commit_message>
<xml_diff>
--- a/docs/diagrams/powerpoint/User Guide Diagrams.pptx
+++ b/docs/diagrams/powerpoint/User Guide Diagrams.pptx
@@ -11401,7 +11401,7 @@
                   </a:effectLst>
                   <a:latin typeface="Bahnschrift Light Condensed" panose="020B0502040204020203" pitchFamily="34" charset="0"/>
                 </a:rPr>
-                <a:t>Time left for current </a:t>
+                <a:t>T</a:t>
               </a:r>
               <a:r>
                 <a:rPr lang="en-SG" sz="1400" b="1" dirty="0">
@@ -11417,7 +11417,23 @@
                   </a:effectLst>
                   <a:latin typeface="Bahnschrift Light Condensed" panose="020B0502040204020203" pitchFamily="34" charset="0"/>
                 </a:rPr>
-                <a:t>Card</a:t>
+                <a:t>ime</a:t>
+              </a:r>
+              <a:r>
+                <a:rPr lang="en-SG" sz="1400" dirty="0">
+                  <a:solidFill>
+                    <a:schemeClr val="tx1"/>
+                  </a:solidFill>
+                  <a:effectLst>
+                    <a:outerShdw blurRad="38100" dist="38100" dir="2700000" algn="tl">
+                      <a:srgbClr val="000000">
+                        <a:alpha val="43137"/>
+                      </a:srgbClr>
+                    </a:outerShdw>
+                  </a:effectLst>
+                  <a:latin typeface="Bahnschrift Light Condensed" panose="020B0502040204020203" pitchFamily="34" charset="0"/>
+                </a:rPr>
+                <a:t> left for current Card</a:t>
               </a:r>
             </a:p>
           </p:txBody>

</xml_diff>

<commit_message>
Pimped up Game segment for UG
</commit_message>
<xml_diff>
--- a/docs/diagrams/powerpoint/User Guide Diagrams.pptx
+++ b/docs/diagrams/powerpoint/User Guide Diagrams.pptx
@@ -5,13 +5,16 @@
     <p:sldMasterId id="2147483761" r:id="rId1"/>
   </p:sldMasterIdLst>
   <p:notesMasterIdLst>
-    <p:notesMasterId r:id="rId6"/>
+    <p:notesMasterId r:id="rId9"/>
   </p:notesMasterIdLst>
   <p:sldIdLst>
     <p:sldId id="256" r:id="rId2"/>
     <p:sldId id="257" r:id="rId3"/>
     <p:sldId id="258" r:id="rId4"/>
     <p:sldId id="259" r:id="rId5"/>
+    <p:sldId id="260" r:id="rId6"/>
+    <p:sldId id="261" r:id="rId7"/>
+    <p:sldId id="262" r:id="rId8"/>
   </p:sldIdLst>
   <p:sldSz cx="12192000" cy="6858000"/>
   <p:notesSz cx="6858000" cy="9144000"/>
@@ -819,6 +822,241 @@
     <p:extLst>
       <p:ext uri="{BB962C8B-B14F-4D97-AF65-F5344CB8AC3E}">
         <p14:creationId xmlns:p14="http://schemas.microsoft.com/office/powerpoint/2010/main" val="186326868"/>
+      </p:ext>
+    </p:extLst>
+  </p:cSld>
+  <p:clrMapOvr>
+    <a:masterClrMapping/>
+  </p:clrMapOvr>
+</p:notes>
+</file>
+
+<file path=ppt/notesSlides/notesSlide5.xml><?xml version="1.0" encoding="utf-8"?>
+<p:notes xmlns:a="http://schemas.openxmlformats.org/drawingml/2006/main" xmlns:r="http://schemas.openxmlformats.org/officeDocument/2006/relationships" xmlns:p="http://schemas.openxmlformats.org/presentationml/2006/main">
+  <p:cSld>
+    <p:spTree>
+      <p:nvGrpSpPr>
+        <p:cNvPr id="1" name=""/>
+        <p:cNvGrpSpPr/>
+        <p:nvPr/>
+      </p:nvGrpSpPr>
+      <p:grpSpPr>
+        <a:xfrm>
+          <a:off x="0" y="0"/>
+          <a:ext cx="0" cy="0"/>
+          <a:chOff x="0" y="0"/>
+          <a:chExt cx="0" cy="0"/>
+        </a:xfrm>
+      </p:grpSpPr>
+      <p:sp>
+        <p:nvSpPr>
+          <p:cNvPr id="2" name="Slide Image Placeholder 1"/>
+          <p:cNvSpPr>
+            <a:spLocks noGrp="1" noRot="1" noChangeAspect="1"/>
+          </p:cNvSpPr>
+          <p:nvPr>
+            <p:ph type="sldImg"/>
+          </p:nvPr>
+        </p:nvSpPr>
+        <p:spPr/>
+      </p:sp>
+      <p:sp>
+        <p:nvSpPr>
+          <p:cNvPr id="3" name="Notes Placeholder 2"/>
+          <p:cNvSpPr>
+            <a:spLocks noGrp="1"/>
+          </p:cNvSpPr>
+          <p:nvPr>
+            <p:ph type="body" idx="1"/>
+          </p:nvPr>
+        </p:nvSpPr>
+        <p:spPr/>
+        <p:txBody>
+          <a:bodyPr/>
+          <a:lstStyle/>
+          <a:p>
+            <a:pPr marL="0" marR="0" lvl="0" indent="0" algn="l" defTabSz="914400" rtl="0" eaLnBrk="1" fontAlgn="auto" latinLnBrk="0" hangingPunct="1">
+              <a:lnSpc>
+                <a:spcPct val="100000"/>
+              </a:lnSpc>
+              <a:spcBef>
+                <a:spcPts val="0"/>
+              </a:spcBef>
+              <a:spcAft>
+                <a:spcPts val="0"/>
+              </a:spcAft>
+              <a:buClrTx/>
+              <a:buSzTx/>
+              <a:buFontTx/>
+              <a:buNone/>
+              <a:tabLst/>
+              <a:defRPr/>
+            </a:pPr>
+            <a:r>
+              <a:rPr lang="en-SG" dirty="0"/>
+              <a:t>UserGuideGameSessionDiagram2</a:t>
+            </a:r>
+          </a:p>
+          <a:p>
+            <a:endParaRPr lang="en-SG" dirty="0"/>
+          </a:p>
+        </p:txBody>
+      </p:sp>
+      <p:sp>
+        <p:nvSpPr>
+          <p:cNvPr id="4" name="Slide Number Placeholder 3"/>
+          <p:cNvSpPr>
+            <a:spLocks noGrp="1"/>
+          </p:cNvSpPr>
+          <p:nvPr>
+            <p:ph type="sldNum" sz="quarter" idx="5"/>
+          </p:nvPr>
+        </p:nvSpPr>
+        <p:spPr/>
+        <p:txBody>
+          <a:bodyPr/>
+          <a:lstStyle/>
+          <a:p>
+            <a:fld id="{0FCAFDEF-04E4-4E08-87E8-ABCCC2F47D5C}" type="slidenum">
+              <a:rPr lang="en-SG" smtClean="0"/>
+              <a:t>5</a:t>
+            </a:fld>
+            <a:endParaRPr lang="en-SG"/>
+          </a:p>
+        </p:txBody>
+      </p:sp>
+    </p:spTree>
+    <p:extLst>
+      <p:ext uri="{BB962C8B-B14F-4D97-AF65-F5344CB8AC3E}">
+        <p14:creationId xmlns:p14="http://schemas.microsoft.com/office/powerpoint/2010/main" val="3996602733"/>
+      </p:ext>
+    </p:extLst>
+  </p:cSld>
+  <p:clrMapOvr>
+    <a:masterClrMapping/>
+  </p:clrMapOvr>
+</p:notes>
+</file>
+
+<file path=ppt/notesSlides/notesSlide6.xml><?xml version="1.0" encoding="utf-8"?>
+<p:notes xmlns:a="http://schemas.openxmlformats.org/drawingml/2006/main" xmlns:r="http://schemas.openxmlformats.org/officeDocument/2006/relationships" xmlns:p="http://schemas.openxmlformats.org/presentationml/2006/main">
+  <p:cSld>
+    <p:spTree>
+      <p:nvGrpSpPr>
+        <p:cNvPr id="1" name=""/>
+        <p:cNvGrpSpPr/>
+        <p:nvPr/>
+      </p:nvGrpSpPr>
+      <p:grpSpPr>
+        <a:xfrm>
+          <a:off x="0" y="0"/>
+          <a:ext cx="0" cy="0"/>
+          <a:chOff x="0" y="0"/>
+          <a:chExt cx="0" cy="0"/>
+        </a:xfrm>
+      </p:grpSpPr>
+      <p:sp>
+        <p:nvSpPr>
+          <p:cNvPr id="2" name="Slide Image Placeholder 1"/>
+          <p:cNvSpPr>
+            <a:spLocks noGrp="1" noRot="1" noChangeAspect="1"/>
+          </p:cNvSpPr>
+          <p:nvPr>
+            <p:ph type="sldImg"/>
+          </p:nvPr>
+        </p:nvSpPr>
+        <p:spPr/>
+      </p:sp>
+      <p:sp>
+        <p:nvSpPr>
+          <p:cNvPr id="3" name="Notes Placeholder 2"/>
+          <p:cNvSpPr>
+            <a:spLocks noGrp="1"/>
+          </p:cNvSpPr>
+          <p:nvPr>
+            <p:ph type="body" idx="1"/>
+          </p:nvPr>
+        </p:nvSpPr>
+        <p:spPr/>
+        <p:txBody>
+          <a:bodyPr/>
+          <a:lstStyle/>
+          <a:p>
+            <a:pPr marL="0" marR="0" lvl="0" indent="0" algn="l" defTabSz="914400" rtl="0" eaLnBrk="1" fontAlgn="auto" latinLnBrk="0" hangingPunct="1">
+              <a:lnSpc>
+                <a:spcPct val="100000"/>
+              </a:lnSpc>
+              <a:spcBef>
+                <a:spcPts val="0"/>
+              </a:spcBef>
+              <a:spcAft>
+                <a:spcPts val="0"/>
+              </a:spcAft>
+              <a:buClrTx/>
+              <a:buSzTx/>
+              <a:buFontTx/>
+              <a:buNone/>
+              <a:tabLst/>
+              <a:defRPr/>
+            </a:pPr>
+            <a:r>
+              <a:rPr lang="en-SG" dirty="0" err="1"/>
+              <a:t>UserGuideGameOverDiagram</a:t>
+            </a:r>
+            <a:endParaRPr lang="en-SG" dirty="0"/>
+          </a:p>
+          <a:p>
+            <a:pPr marL="0" marR="0" lvl="0" indent="0" algn="l" defTabSz="914400" rtl="0" eaLnBrk="1" fontAlgn="auto" latinLnBrk="0" hangingPunct="1">
+              <a:lnSpc>
+                <a:spcPct val="100000"/>
+              </a:lnSpc>
+              <a:spcBef>
+                <a:spcPts val="0"/>
+              </a:spcBef>
+              <a:spcAft>
+                <a:spcPts val="0"/>
+              </a:spcAft>
+              <a:buClrTx/>
+              <a:buSzTx/>
+              <a:buFontTx/>
+              <a:buNone/>
+              <a:tabLst/>
+              <a:defRPr/>
+            </a:pPr>
+            <a:endParaRPr lang="en-SG" dirty="0"/>
+          </a:p>
+          <a:p>
+            <a:endParaRPr lang="en-SG" dirty="0"/>
+          </a:p>
+        </p:txBody>
+      </p:sp>
+      <p:sp>
+        <p:nvSpPr>
+          <p:cNvPr id="4" name="Slide Number Placeholder 3"/>
+          <p:cNvSpPr>
+            <a:spLocks noGrp="1"/>
+          </p:cNvSpPr>
+          <p:nvPr>
+            <p:ph type="sldNum" sz="quarter" idx="5"/>
+          </p:nvPr>
+        </p:nvSpPr>
+        <p:spPr/>
+        <p:txBody>
+          <a:bodyPr/>
+          <a:lstStyle/>
+          <a:p>
+            <a:fld id="{0FCAFDEF-04E4-4E08-87E8-ABCCC2F47D5C}" type="slidenum">
+              <a:rPr lang="en-SG" smtClean="0"/>
+              <a:t>6</a:t>
+            </a:fld>
+            <a:endParaRPr lang="en-SG"/>
+          </a:p>
+        </p:txBody>
+      </p:sp>
+    </p:spTree>
+    <p:extLst>
+      <p:ext uri="{BB962C8B-B14F-4D97-AF65-F5344CB8AC3E}">
+        <p14:creationId xmlns:p14="http://schemas.microsoft.com/office/powerpoint/2010/main" val="2530896308"/>
       </p:ext>
     </p:extLst>
   </p:cSld>
@@ -11810,6 +12048,1242 @@
 </p:sld>
 </file>
 
+<file path=ppt/slides/slide5.xml><?xml version="1.0" encoding="utf-8"?>
+<p:sld xmlns:a="http://schemas.openxmlformats.org/drawingml/2006/main" xmlns:r="http://schemas.openxmlformats.org/officeDocument/2006/relationships" xmlns:p="http://schemas.openxmlformats.org/presentationml/2006/main">
+  <p:cSld>
+    <p:spTree>
+      <p:nvGrpSpPr>
+        <p:cNvPr id="1" name=""/>
+        <p:cNvGrpSpPr/>
+        <p:nvPr/>
+      </p:nvGrpSpPr>
+      <p:grpSpPr>
+        <a:xfrm>
+          <a:off x="0" y="0"/>
+          <a:ext cx="0" cy="0"/>
+          <a:chOff x="0" y="0"/>
+          <a:chExt cx="0" cy="0"/>
+        </a:xfrm>
+      </p:grpSpPr>
+      <p:grpSp>
+        <p:nvGrpSpPr>
+          <p:cNvPr id="16" name="Group 15">
+            <a:extLst>
+              <a:ext uri="{FF2B5EF4-FFF2-40B4-BE49-F238E27FC236}">
+                <a16:creationId xmlns:a16="http://schemas.microsoft.com/office/drawing/2014/main" id="{E3E6C150-4AF7-4D0F-8DDE-5476DE4EC13C}"/>
+              </a:ext>
+            </a:extLst>
+          </p:cNvPr>
+          <p:cNvGrpSpPr/>
+          <p:nvPr/>
+        </p:nvGrpSpPr>
+        <p:grpSpPr>
+          <a:xfrm>
+            <a:off x="2962656" y="276860"/>
+            <a:ext cx="7115645" cy="5361940"/>
+            <a:chOff x="2962656" y="276860"/>
+            <a:chExt cx="7115645" cy="5361940"/>
+          </a:xfrm>
+        </p:grpSpPr>
+        <p:pic>
+          <p:nvPicPr>
+            <p:cNvPr id="5" name="Picture 4">
+              <a:extLst>
+                <a:ext uri="{FF2B5EF4-FFF2-40B4-BE49-F238E27FC236}">
+                  <a16:creationId xmlns:a16="http://schemas.microsoft.com/office/drawing/2014/main" id="{EAF06261-D6B8-4DFD-8B64-BB792BA7CA23}"/>
+                </a:ext>
+              </a:extLst>
+            </p:cNvPr>
+            <p:cNvPicPr>
+              <a:picLocks noChangeAspect="1"/>
+            </p:cNvPicPr>
+            <p:nvPr/>
+          </p:nvPicPr>
+          <p:blipFill rotWithShape="1">
+            <a:blip r:embed="rId3"/>
+            <a:srcRect l="24301" t="4977" r="17949" b="17778"/>
+            <a:stretch/>
+          </p:blipFill>
+          <p:spPr>
+            <a:xfrm>
+              <a:off x="2962656" y="341376"/>
+              <a:ext cx="7040880" cy="5297424"/>
+            </a:xfrm>
+            <a:prstGeom prst="rect">
+              <a:avLst/>
+            </a:prstGeom>
+            <a:solidFill>
+              <a:srgbClr val="FFFFFF">
+                <a:shade val="85000"/>
+              </a:srgbClr>
+            </a:solidFill>
+            <a:ln w="88900" cap="sq">
+              <a:solidFill>
+                <a:srgbClr val="FFFFFF"/>
+              </a:solidFill>
+              <a:miter lim="800000"/>
+            </a:ln>
+            <a:effectLst>
+              <a:outerShdw blurRad="55000" dist="18000" dir="5400000" algn="tl" rotWithShape="0">
+                <a:srgbClr val="000000">
+                  <a:alpha val="40000"/>
+                </a:srgbClr>
+              </a:outerShdw>
+            </a:effectLst>
+            <a:scene3d>
+              <a:camera prst="orthographicFront"/>
+              <a:lightRig rig="twoPt" dir="t">
+                <a:rot lat="0" lon="0" rev="7200000"/>
+              </a:lightRig>
+            </a:scene3d>
+            <a:sp3d>
+              <a:bevelT w="25400" h="19050"/>
+              <a:contourClr>
+                <a:srgbClr val="FFFFFF"/>
+              </a:contourClr>
+            </a:sp3d>
+          </p:spPr>
+        </p:pic>
+        <p:sp>
+          <p:nvSpPr>
+            <p:cNvPr id="8" name="Rectangle: Rounded Corners 7">
+              <a:extLst>
+                <a:ext uri="{FF2B5EF4-FFF2-40B4-BE49-F238E27FC236}">
+                  <a16:creationId xmlns:a16="http://schemas.microsoft.com/office/drawing/2014/main" id="{2C4967A9-E2DF-4949-B4FA-F66948402BC6}"/>
+                </a:ext>
+              </a:extLst>
+            </p:cNvPr>
+            <p:cNvSpPr/>
+            <p:nvPr/>
+          </p:nvSpPr>
+          <p:spPr>
+            <a:xfrm>
+              <a:off x="2977975" y="1504189"/>
+              <a:ext cx="7025561" cy="848868"/>
+            </a:xfrm>
+            <a:prstGeom prst="roundRect">
+              <a:avLst/>
+            </a:prstGeom>
+            <a:noFill/>
+            <a:ln w="19050">
+              <a:solidFill>
+                <a:srgbClr val="FF0000"/>
+              </a:solidFill>
+              <a:prstDash val="sysDash"/>
+            </a:ln>
+          </p:spPr>
+          <p:style>
+            <a:lnRef idx="2">
+              <a:schemeClr val="accent1">
+                <a:shade val="50000"/>
+              </a:schemeClr>
+            </a:lnRef>
+            <a:fillRef idx="1">
+              <a:schemeClr val="accent1"/>
+            </a:fillRef>
+            <a:effectRef idx="0">
+              <a:schemeClr val="accent1"/>
+            </a:effectRef>
+            <a:fontRef idx="minor">
+              <a:schemeClr val="lt1"/>
+            </a:fontRef>
+          </p:style>
+          <p:txBody>
+            <a:bodyPr rtlCol="0" anchor="ctr"/>
+            <a:lstStyle/>
+            <a:p>
+              <a:pPr algn="ctr"/>
+              <a:endParaRPr lang="en-SG" dirty="0"/>
+            </a:p>
+          </p:txBody>
+        </p:sp>
+        <p:sp>
+          <p:nvSpPr>
+            <p:cNvPr id="9" name="Rectangle: Rounded Corners 8">
+              <a:extLst>
+                <a:ext uri="{FF2B5EF4-FFF2-40B4-BE49-F238E27FC236}">
+                  <a16:creationId xmlns:a16="http://schemas.microsoft.com/office/drawing/2014/main" id="{E540A1BD-7A17-4F17-8400-40455B1824D3}"/>
+                </a:ext>
+              </a:extLst>
+            </p:cNvPr>
+            <p:cNvSpPr/>
+            <p:nvPr/>
+          </p:nvSpPr>
+          <p:spPr>
+            <a:xfrm>
+              <a:off x="7652931" y="1330452"/>
+              <a:ext cx="2259244" cy="429767"/>
+            </a:xfrm>
+            <a:prstGeom prst="roundRect">
+              <a:avLst/>
+            </a:prstGeom>
+            <a:solidFill>
+              <a:srgbClr val="F86262"/>
+            </a:solidFill>
+            <a:ln>
+              <a:solidFill>
+                <a:srgbClr val="FF0000"/>
+              </a:solidFill>
+            </a:ln>
+          </p:spPr>
+          <p:style>
+            <a:lnRef idx="2">
+              <a:schemeClr val="accent1">
+                <a:shade val="50000"/>
+              </a:schemeClr>
+            </a:lnRef>
+            <a:fillRef idx="1">
+              <a:schemeClr val="accent1"/>
+            </a:fillRef>
+            <a:effectRef idx="0">
+              <a:schemeClr val="accent1"/>
+            </a:effectRef>
+            <a:fontRef idx="minor">
+              <a:schemeClr val="lt1"/>
+            </a:fontRef>
+          </p:style>
+          <p:txBody>
+            <a:bodyPr rtlCol="0" anchor="ctr"/>
+            <a:lstStyle/>
+            <a:p>
+              <a:pPr algn="ctr"/>
+              <a:r>
+                <a:rPr lang="en-SG" sz="1400" dirty="0">
+                  <a:solidFill>
+                    <a:schemeClr val="tx1"/>
+                  </a:solidFill>
+                  <a:effectLst>
+                    <a:outerShdw blurRad="38100" dist="38100" dir="2700000" algn="tl">
+                      <a:srgbClr val="000000">
+                        <a:alpha val="43137"/>
+                      </a:srgbClr>
+                    </a:outerShdw>
+                  </a:effectLst>
+                  <a:latin typeface="Bahnschrift Light Condensed" panose="020B0502040204020203" pitchFamily="34" charset="0"/>
+                </a:rPr>
+                <a:t>Feedback for each </a:t>
+              </a:r>
+              <a:r>
+                <a:rPr lang="en-SG" sz="1400" b="1" dirty="0">
+                  <a:solidFill>
+                    <a:schemeClr val="tx1"/>
+                  </a:solidFill>
+                  <a:effectLst>
+                    <a:outerShdw blurRad="38100" dist="38100" dir="2700000" algn="tl">
+                      <a:srgbClr val="000000">
+                        <a:alpha val="43137"/>
+                      </a:srgbClr>
+                    </a:outerShdw>
+                  </a:effectLst>
+                  <a:latin typeface="Bahnschrift Light Condensed" panose="020B0502040204020203" pitchFamily="34" charset="0"/>
+                </a:rPr>
+                <a:t>Guess</a:t>
+              </a:r>
+              <a:endParaRPr lang="en-SG" sz="1400" dirty="0">
+                <a:solidFill>
+                  <a:schemeClr val="tx1"/>
+                </a:solidFill>
+                <a:effectLst>
+                  <a:outerShdw blurRad="38100" dist="38100" dir="2700000" algn="tl">
+                    <a:srgbClr val="000000">
+                      <a:alpha val="43137"/>
+                    </a:srgbClr>
+                  </a:outerShdw>
+                </a:effectLst>
+                <a:latin typeface="Bahnschrift Light Condensed" panose="020B0502040204020203" pitchFamily="34" charset="0"/>
+              </a:endParaRPr>
+            </a:p>
+          </p:txBody>
+        </p:sp>
+        <p:sp>
+          <p:nvSpPr>
+            <p:cNvPr id="10" name="Rectangle: Rounded Corners 9">
+              <a:extLst>
+                <a:ext uri="{FF2B5EF4-FFF2-40B4-BE49-F238E27FC236}">
+                  <a16:creationId xmlns:a16="http://schemas.microsoft.com/office/drawing/2014/main" id="{6162EAD9-29C4-493A-97CE-DEFFF82441D7}"/>
+                </a:ext>
+              </a:extLst>
+            </p:cNvPr>
+            <p:cNvSpPr/>
+            <p:nvPr/>
+          </p:nvSpPr>
+          <p:spPr>
+            <a:xfrm>
+              <a:off x="3139440" y="1627633"/>
+              <a:ext cx="1103375" cy="243840"/>
+            </a:xfrm>
+            <a:prstGeom prst="roundRect">
+              <a:avLst/>
+            </a:prstGeom>
+            <a:noFill/>
+            <a:ln w="19050">
+              <a:solidFill>
+                <a:srgbClr val="FF0000"/>
+              </a:solidFill>
+              <a:prstDash val="sysDash"/>
+            </a:ln>
+          </p:spPr>
+          <p:style>
+            <a:lnRef idx="2">
+              <a:schemeClr val="accent1">
+                <a:shade val="50000"/>
+              </a:schemeClr>
+            </a:lnRef>
+            <a:fillRef idx="1">
+              <a:schemeClr val="accent1"/>
+            </a:fillRef>
+            <a:effectRef idx="0">
+              <a:schemeClr val="accent1"/>
+            </a:effectRef>
+            <a:fontRef idx="minor">
+              <a:schemeClr val="lt1"/>
+            </a:fontRef>
+          </p:style>
+          <p:txBody>
+            <a:bodyPr rtlCol="0" anchor="ctr"/>
+            <a:lstStyle/>
+            <a:p>
+              <a:pPr algn="ctr"/>
+              <a:endParaRPr lang="en-SG" dirty="0"/>
+            </a:p>
+          </p:txBody>
+        </p:sp>
+        <p:sp>
+          <p:nvSpPr>
+            <p:cNvPr id="12" name="Rectangle: Rounded Corners 11">
+              <a:extLst>
+                <a:ext uri="{FF2B5EF4-FFF2-40B4-BE49-F238E27FC236}">
+                  <a16:creationId xmlns:a16="http://schemas.microsoft.com/office/drawing/2014/main" id="{2745BBF1-CAE0-43D9-B37E-1481C2F2F60F}"/>
+                </a:ext>
+              </a:extLst>
+            </p:cNvPr>
+            <p:cNvSpPr/>
+            <p:nvPr/>
+          </p:nvSpPr>
+          <p:spPr>
+            <a:xfrm>
+              <a:off x="3851565" y="543895"/>
+              <a:ext cx="6226736" cy="304974"/>
+            </a:xfrm>
+            <a:prstGeom prst="roundRect">
+              <a:avLst/>
+            </a:prstGeom>
+            <a:noFill/>
+            <a:ln w="19050">
+              <a:solidFill>
+                <a:srgbClr val="00B050"/>
+              </a:solidFill>
+              <a:prstDash val="sysDash"/>
+            </a:ln>
+          </p:spPr>
+          <p:style>
+            <a:lnRef idx="2">
+              <a:schemeClr val="accent1">
+                <a:shade val="50000"/>
+              </a:schemeClr>
+            </a:lnRef>
+            <a:fillRef idx="1">
+              <a:schemeClr val="accent1"/>
+            </a:fillRef>
+            <a:effectRef idx="0">
+              <a:schemeClr val="accent1"/>
+            </a:effectRef>
+            <a:fontRef idx="minor">
+              <a:schemeClr val="lt1"/>
+            </a:fontRef>
+          </p:style>
+          <p:txBody>
+            <a:bodyPr rtlCol="0" anchor="ctr"/>
+            <a:lstStyle/>
+            <a:p>
+              <a:pPr algn="ctr"/>
+              <a:endParaRPr lang="en-SG" dirty="0"/>
+            </a:p>
+          </p:txBody>
+        </p:sp>
+        <p:sp>
+          <p:nvSpPr>
+            <p:cNvPr id="13" name="Rectangle: Rounded Corners 12">
+              <a:extLst>
+                <a:ext uri="{FF2B5EF4-FFF2-40B4-BE49-F238E27FC236}">
+                  <a16:creationId xmlns:a16="http://schemas.microsoft.com/office/drawing/2014/main" id="{4A1A3FEE-6BEC-46A8-89CC-B62FAD910099}"/>
+                </a:ext>
+              </a:extLst>
+            </p:cNvPr>
+            <p:cNvSpPr/>
+            <p:nvPr/>
+          </p:nvSpPr>
+          <p:spPr>
+            <a:xfrm>
+              <a:off x="7598156" y="276860"/>
+              <a:ext cx="2466340" cy="378461"/>
+            </a:xfrm>
+            <a:prstGeom prst="roundRect">
+              <a:avLst/>
+            </a:prstGeom>
+            <a:solidFill>
+              <a:srgbClr val="92D050"/>
+            </a:solidFill>
+            <a:ln>
+              <a:solidFill>
+                <a:srgbClr val="00B050"/>
+              </a:solidFill>
+            </a:ln>
+          </p:spPr>
+          <p:style>
+            <a:lnRef idx="2">
+              <a:schemeClr val="accent1">
+                <a:shade val="50000"/>
+              </a:schemeClr>
+            </a:lnRef>
+            <a:fillRef idx="1">
+              <a:schemeClr val="accent1"/>
+            </a:fillRef>
+            <a:effectRef idx="0">
+              <a:schemeClr val="accent1"/>
+            </a:effectRef>
+            <a:fontRef idx="minor">
+              <a:schemeClr val="lt1"/>
+            </a:fontRef>
+          </p:style>
+          <p:txBody>
+            <a:bodyPr rtlCol="0" anchor="ctr"/>
+            <a:lstStyle/>
+            <a:p>
+              <a:pPr algn="ctr"/>
+              <a:r>
+                <a:rPr lang="en-SG" sz="1400" dirty="0">
+                  <a:solidFill>
+                    <a:schemeClr val="tx1"/>
+                  </a:solidFill>
+                  <a:effectLst>
+                    <a:outerShdw blurRad="38100" dist="38100" dir="2700000" algn="tl">
+                      <a:srgbClr val="000000">
+                        <a:alpha val="43137"/>
+                      </a:srgbClr>
+                    </a:outerShdw>
+                  </a:effectLst>
+                  <a:latin typeface="Bahnschrift Light Condensed" panose="020B0502040204020203" pitchFamily="34" charset="0"/>
+                </a:rPr>
+                <a:t>T</a:t>
+              </a:r>
+              <a:r>
+                <a:rPr lang="en-SG" sz="1400" b="1" dirty="0">
+                  <a:solidFill>
+                    <a:schemeClr val="tx1"/>
+                  </a:solidFill>
+                  <a:effectLst>
+                    <a:outerShdw blurRad="38100" dist="38100" dir="2700000" algn="tl">
+                      <a:srgbClr val="000000">
+                        <a:alpha val="43137"/>
+                      </a:srgbClr>
+                    </a:outerShdw>
+                  </a:effectLst>
+                  <a:latin typeface="Bahnschrift Light Condensed" panose="020B0502040204020203" pitchFamily="34" charset="0"/>
+                </a:rPr>
+                <a:t>imer </a:t>
+              </a:r>
+              <a:r>
+                <a:rPr lang="en-SG" sz="1400" dirty="0">
+                  <a:solidFill>
+                    <a:schemeClr val="tx1"/>
+                  </a:solidFill>
+                  <a:effectLst>
+                    <a:outerShdw blurRad="38100" dist="38100" dir="2700000" algn="tl">
+                      <a:srgbClr val="000000">
+                        <a:alpha val="43137"/>
+                      </a:srgbClr>
+                    </a:outerShdw>
+                  </a:effectLst>
+                  <a:latin typeface="Bahnschrift Light Condensed" panose="020B0502040204020203" pitchFamily="34" charset="0"/>
+                </a:rPr>
+                <a:t>changes colour </a:t>
+              </a:r>
+              <a:br>
+                <a:rPr lang="en-SG" sz="1400" dirty="0">
+                  <a:solidFill>
+                    <a:schemeClr val="tx1"/>
+                  </a:solidFill>
+                  <a:effectLst>
+                    <a:outerShdw blurRad="38100" dist="38100" dir="2700000" algn="tl">
+                      <a:srgbClr val="000000">
+                        <a:alpha val="43137"/>
+                      </a:srgbClr>
+                    </a:outerShdw>
+                  </a:effectLst>
+                  <a:latin typeface="Bahnschrift Light Condensed" panose="020B0502040204020203" pitchFamily="34" charset="0"/>
+                </a:rPr>
+              </a:br>
+              <a:r>
+                <a:rPr lang="en-SG" sz="1400" dirty="0">
+                  <a:solidFill>
+                    <a:schemeClr val="tx1"/>
+                  </a:solidFill>
+                  <a:effectLst>
+                    <a:outerShdw blurRad="38100" dist="38100" dir="2700000" algn="tl">
+                      <a:srgbClr val="000000">
+                        <a:alpha val="43137"/>
+                      </a:srgbClr>
+                    </a:outerShdw>
+                  </a:effectLst>
+                  <a:latin typeface="Bahnschrift Light Condensed" panose="020B0502040204020203" pitchFamily="34" charset="0"/>
+                </a:rPr>
+                <a:t>when time is running out</a:t>
+              </a:r>
+              <a:endParaRPr lang="en-SG" sz="1400" b="1" dirty="0">
+                <a:solidFill>
+                  <a:schemeClr val="tx1"/>
+                </a:solidFill>
+                <a:effectLst>
+                  <a:outerShdw blurRad="38100" dist="38100" dir="2700000" algn="tl">
+                    <a:srgbClr val="000000">
+                      <a:alpha val="43137"/>
+                    </a:srgbClr>
+                  </a:outerShdw>
+                </a:effectLst>
+                <a:latin typeface="Bahnschrift Light Condensed" panose="020B0502040204020203" pitchFamily="34" charset="0"/>
+              </a:endParaRPr>
+            </a:p>
+          </p:txBody>
+        </p:sp>
+      </p:grpSp>
+    </p:spTree>
+    <p:extLst>
+      <p:ext uri="{BB962C8B-B14F-4D97-AF65-F5344CB8AC3E}">
+        <p14:creationId xmlns:p14="http://schemas.microsoft.com/office/powerpoint/2010/main" val="317800843"/>
+      </p:ext>
+    </p:extLst>
+  </p:cSld>
+  <p:clrMapOvr>
+    <a:masterClrMapping/>
+  </p:clrMapOvr>
+</p:sld>
+</file>
+
+<file path=ppt/slides/slide6.xml><?xml version="1.0" encoding="utf-8"?>
+<p:sld xmlns:a="http://schemas.openxmlformats.org/drawingml/2006/main" xmlns:r="http://schemas.openxmlformats.org/officeDocument/2006/relationships" xmlns:p="http://schemas.openxmlformats.org/presentationml/2006/main">
+  <p:cSld>
+    <p:spTree>
+      <p:nvGrpSpPr>
+        <p:cNvPr id="1" name=""/>
+        <p:cNvGrpSpPr/>
+        <p:nvPr/>
+      </p:nvGrpSpPr>
+      <p:grpSpPr>
+        <a:xfrm>
+          <a:off x="0" y="0"/>
+          <a:ext cx="0" cy="0"/>
+          <a:chOff x="0" y="0"/>
+          <a:chExt cx="0" cy="0"/>
+        </a:xfrm>
+      </p:grpSpPr>
+      <p:pic>
+        <p:nvPicPr>
+          <p:cNvPr id="2" name="Picture 1">
+            <a:extLst>
+              <a:ext uri="{FF2B5EF4-FFF2-40B4-BE49-F238E27FC236}">
+                <a16:creationId xmlns:a16="http://schemas.microsoft.com/office/drawing/2014/main" id="{8FA60423-CF98-4843-8FA5-D61737176228}"/>
+              </a:ext>
+            </a:extLst>
+          </p:cNvPr>
+          <p:cNvPicPr>
+            <a:picLocks noChangeAspect="1"/>
+          </p:cNvPicPr>
+          <p:nvPr/>
+        </p:nvPicPr>
+        <p:blipFill rotWithShape="1">
+          <a:blip r:embed="rId3"/>
+          <a:srcRect l="24583" t="4741" r="17750" b="6075"/>
+          <a:stretch/>
+        </p:blipFill>
+        <p:spPr>
+          <a:xfrm>
+            <a:off x="2997200" y="325120"/>
+            <a:ext cx="7030720" cy="6116320"/>
+          </a:xfrm>
+          <a:prstGeom prst="rect">
+            <a:avLst/>
+          </a:prstGeom>
+          <a:solidFill>
+            <a:srgbClr val="FFFFFF">
+              <a:shade val="85000"/>
+            </a:srgbClr>
+          </a:solidFill>
+          <a:ln w="88900" cap="sq">
+            <a:solidFill>
+              <a:srgbClr val="FFFFFF"/>
+            </a:solidFill>
+            <a:miter lim="800000"/>
+          </a:ln>
+          <a:effectLst>
+            <a:outerShdw blurRad="55000" dist="18000" dir="5400000" algn="tl" rotWithShape="0">
+              <a:srgbClr val="000000">
+                <a:alpha val="40000"/>
+              </a:srgbClr>
+            </a:outerShdw>
+          </a:effectLst>
+          <a:scene3d>
+            <a:camera prst="orthographicFront"/>
+            <a:lightRig rig="twoPt" dir="t">
+              <a:rot lat="0" lon="0" rev="7200000"/>
+            </a:lightRig>
+          </a:scene3d>
+          <a:sp3d>
+            <a:bevelT w="25400" h="19050"/>
+            <a:contourClr>
+              <a:srgbClr val="FFFFFF"/>
+            </a:contourClr>
+          </a:sp3d>
+        </p:spPr>
+      </p:pic>
+      <p:sp>
+        <p:nvSpPr>
+          <p:cNvPr id="11" name="Rectangle: Rounded Corners 10">
+            <a:extLst>
+              <a:ext uri="{FF2B5EF4-FFF2-40B4-BE49-F238E27FC236}">
+                <a16:creationId xmlns:a16="http://schemas.microsoft.com/office/drawing/2014/main" id="{AE24FBA4-AA9B-481A-9D0D-E1A115033A14}"/>
+              </a:ext>
+            </a:extLst>
+          </p:cNvPr>
+          <p:cNvSpPr/>
+          <p:nvPr/>
+        </p:nvSpPr>
+        <p:spPr>
+          <a:xfrm>
+            <a:off x="2977975" y="2215299"/>
+            <a:ext cx="7025561" cy="2771480"/>
+          </a:xfrm>
+          <a:prstGeom prst="roundRect">
+            <a:avLst/>
+          </a:prstGeom>
+          <a:noFill/>
+          <a:ln w="19050">
+            <a:solidFill>
+              <a:srgbClr val="FF0000"/>
+            </a:solidFill>
+            <a:prstDash val="sysDash"/>
+          </a:ln>
+        </p:spPr>
+        <p:style>
+          <a:lnRef idx="2">
+            <a:schemeClr val="accent1">
+              <a:shade val="50000"/>
+            </a:schemeClr>
+          </a:lnRef>
+          <a:fillRef idx="1">
+            <a:schemeClr val="accent1"/>
+          </a:fillRef>
+          <a:effectRef idx="0">
+            <a:schemeClr val="accent1"/>
+          </a:effectRef>
+          <a:fontRef idx="minor">
+            <a:schemeClr val="lt1"/>
+          </a:fontRef>
+        </p:style>
+        <p:txBody>
+          <a:bodyPr rtlCol="0" anchor="ctr"/>
+          <a:lstStyle/>
+          <a:p>
+            <a:pPr algn="ctr"/>
+            <a:endParaRPr lang="en-SG" dirty="0"/>
+          </a:p>
+        </p:txBody>
+      </p:sp>
+      <p:sp>
+        <p:nvSpPr>
+          <p:cNvPr id="14" name="Rectangle: Rounded Corners 13">
+            <a:extLst>
+              <a:ext uri="{FF2B5EF4-FFF2-40B4-BE49-F238E27FC236}">
+                <a16:creationId xmlns:a16="http://schemas.microsoft.com/office/drawing/2014/main" id="{FDDD965E-EABF-44AB-ACE4-2DA2168F1C6E}"/>
+              </a:ext>
+            </a:extLst>
+          </p:cNvPr>
+          <p:cNvSpPr/>
+          <p:nvPr/>
+        </p:nvSpPr>
+        <p:spPr>
+          <a:xfrm>
+            <a:off x="7652931" y="1933768"/>
+            <a:ext cx="2259244" cy="429767"/>
+          </a:xfrm>
+          <a:prstGeom prst="roundRect">
+            <a:avLst/>
+          </a:prstGeom>
+          <a:solidFill>
+            <a:srgbClr val="F86262"/>
+          </a:solidFill>
+          <a:ln>
+            <a:solidFill>
+              <a:srgbClr val="FF0000"/>
+            </a:solidFill>
+          </a:ln>
+        </p:spPr>
+        <p:style>
+          <a:lnRef idx="2">
+            <a:schemeClr val="accent1">
+              <a:shade val="50000"/>
+            </a:schemeClr>
+          </a:lnRef>
+          <a:fillRef idx="1">
+            <a:schemeClr val="accent1"/>
+          </a:fillRef>
+          <a:effectRef idx="0">
+            <a:schemeClr val="accent1"/>
+          </a:effectRef>
+          <a:fontRef idx="minor">
+            <a:schemeClr val="lt1"/>
+          </a:fontRef>
+        </p:style>
+        <p:txBody>
+          <a:bodyPr rtlCol="0" anchor="ctr"/>
+          <a:lstStyle/>
+          <a:p>
+            <a:pPr algn="ctr"/>
+            <a:r>
+              <a:rPr lang="en-SG" sz="1400" dirty="0">
+                <a:solidFill>
+                  <a:schemeClr val="tx1"/>
+                </a:solidFill>
+                <a:effectLst>
+                  <a:outerShdw blurRad="38100" dist="38100" dir="2700000" algn="tl">
+                    <a:srgbClr val="000000">
+                      <a:alpha val="43137"/>
+                    </a:srgbClr>
+                  </a:outerShdw>
+                </a:effectLst>
+                <a:latin typeface="Bahnschrift Light Condensed" panose="020B0502040204020203" pitchFamily="34" charset="0"/>
+              </a:rPr>
+              <a:t>Game Result and</a:t>
+            </a:r>
+          </a:p>
+          <a:p>
+            <a:pPr algn="ctr"/>
+            <a:r>
+              <a:rPr lang="en-SG" sz="1400" dirty="0">
+                <a:solidFill>
+                  <a:schemeClr val="tx1"/>
+                </a:solidFill>
+                <a:effectLst>
+                  <a:outerShdw blurRad="38100" dist="38100" dir="2700000" algn="tl">
+                    <a:srgbClr val="000000">
+                      <a:alpha val="43137"/>
+                    </a:srgbClr>
+                  </a:outerShdw>
+                </a:effectLst>
+                <a:latin typeface="Bahnschrift Light Condensed" panose="020B0502040204020203" pitchFamily="34" charset="0"/>
+              </a:rPr>
+              <a:t> </a:t>
+            </a:r>
+            <a:r>
+              <a:rPr lang="en-SG" sz="1400" b="1" dirty="0">
+                <a:solidFill>
+                  <a:schemeClr val="tx1"/>
+                </a:solidFill>
+                <a:effectLst>
+                  <a:outerShdw blurRad="38100" dist="38100" dir="2700000" algn="tl">
+                    <a:srgbClr val="000000">
+                      <a:alpha val="43137"/>
+                    </a:srgbClr>
+                  </a:outerShdw>
+                </a:effectLst>
+                <a:latin typeface="Bahnschrift Light Condensed" panose="020B0502040204020203" pitchFamily="34" charset="0"/>
+              </a:rPr>
+              <a:t>Statistics</a:t>
+            </a:r>
+            <a:r>
+              <a:rPr lang="en-SG" sz="1400" dirty="0">
+                <a:solidFill>
+                  <a:schemeClr val="tx1"/>
+                </a:solidFill>
+                <a:effectLst>
+                  <a:outerShdw blurRad="38100" dist="38100" dir="2700000" algn="tl">
+                    <a:srgbClr val="000000">
+                      <a:alpha val="43137"/>
+                    </a:srgbClr>
+                  </a:outerShdw>
+                </a:effectLst>
+                <a:latin typeface="Bahnschrift Light Condensed" panose="020B0502040204020203" pitchFamily="34" charset="0"/>
+              </a:rPr>
+              <a:t> are shown here</a:t>
+            </a:r>
+          </a:p>
+        </p:txBody>
+      </p:sp>
+      <p:sp>
+        <p:nvSpPr>
+          <p:cNvPr id="16" name="Rectangle: Rounded Corners 15">
+            <a:extLst>
+              <a:ext uri="{FF2B5EF4-FFF2-40B4-BE49-F238E27FC236}">
+                <a16:creationId xmlns:a16="http://schemas.microsoft.com/office/drawing/2014/main" id="{A1BC5BDE-DCBB-4280-8F82-4A7448238CE9}"/>
+              </a:ext>
+            </a:extLst>
+          </p:cNvPr>
+          <p:cNvSpPr/>
+          <p:nvPr/>
+        </p:nvSpPr>
+        <p:spPr>
+          <a:xfrm>
+            <a:off x="2977975" y="5090474"/>
+            <a:ext cx="7100326" cy="1350965"/>
+          </a:xfrm>
+          <a:prstGeom prst="roundRect">
+            <a:avLst/>
+          </a:prstGeom>
+          <a:noFill/>
+          <a:ln w="19050">
+            <a:solidFill>
+              <a:srgbClr val="00B050"/>
+            </a:solidFill>
+            <a:prstDash val="sysDash"/>
+          </a:ln>
+        </p:spPr>
+        <p:style>
+          <a:lnRef idx="2">
+            <a:schemeClr val="accent1">
+              <a:shade val="50000"/>
+            </a:schemeClr>
+          </a:lnRef>
+          <a:fillRef idx="1">
+            <a:schemeClr val="accent1"/>
+          </a:fillRef>
+          <a:effectRef idx="0">
+            <a:schemeClr val="accent1"/>
+          </a:effectRef>
+          <a:fontRef idx="minor">
+            <a:schemeClr val="lt1"/>
+          </a:fontRef>
+        </p:style>
+        <p:txBody>
+          <a:bodyPr rtlCol="0" anchor="ctr"/>
+          <a:lstStyle/>
+          <a:p>
+            <a:pPr algn="ctr"/>
+            <a:endParaRPr lang="en-SG" dirty="0"/>
+          </a:p>
+        </p:txBody>
+      </p:sp>
+      <p:sp>
+        <p:nvSpPr>
+          <p:cNvPr id="17" name="Rectangle: Rounded Corners 16">
+            <a:extLst>
+              <a:ext uri="{FF2B5EF4-FFF2-40B4-BE49-F238E27FC236}">
+                <a16:creationId xmlns:a16="http://schemas.microsoft.com/office/drawing/2014/main" id="{79DCB0F3-DF05-4884-AF11-40152EE3ABB6}"/>
+              </a:ext>
+            </a:extLst>
+          </p:cNvPr>
+          <p:cNvSpPr/>
+          <p:nvPr/>
+        </p:nvSpPr>
+        <p:spPr>
+          <a:xfrm>
+            <a:off x="7598156" y="4933700"/>
+            <a:ext cx="2466340" cy="429767"/>
+          </a:xfrm>
+          <a:prstGeom prst="roundRect">
+            <a:avLst/>
+          </a:prstGeom>
+          <a:solidFill>
+            <a:srgbClr val="92D050"/>
+          </a:solidFill>
+          <a:ln>
+            <a:solidFill>
+              <a:srgbClr val="00B050"/>
+            </a:solidFill>
+          </a:ln>
+        </p:spPr>
+        <p:style>
+          <a:lnRef idx="2">
+            <a:schemeClr val="accent1">
+              <a:shade val="50000"/>
+            </a:schemeClr>
+          </a:lnRef>
+          <a:fillRef idx="1">
+            <a:schemeClr val="accent1"/>
+          </a:fillRef>
+          <a:effectRef idx="0">
+            <a:schemeClr val="accent1"/>
+          </a:effectRef>
+          <a:fontRef idx="minor">
+            <a:schemeClr val="lt1"/>
+          </a:fontRef>
+        </p:style>
+        <p:txBody>
+          <a:bodyPr rtlCol="0" anchor="ctr"/>
+          <a:lstStyle/>
+          <a:p>
+            <a:pPr algn="ctr"/>
+            <a:r>
+              <a:rPr lang="en-SG" sz="1400" b="1" dirty="0">
+                <a:solidFill>
+                  <a:schemeClr val="tx1"/>
+                </a:solidFill>
+                <a:effectLst>
+                  <a:outerShdw blurRad="38100" dist="38100" dir="2700000" algn="tl">
+                    <a:srgbClr val="000000">
+                      <a:alpha val="43137"/>
+                    </a:srgbClr>
+                  </a:outerShdw>
+                </a:effectLst>
+                <a:latin typeface="Bahnschrift Light Condensed" panose="020B0502040204020203" pitchFamily="34" charset="0"/>
+              </a:rPr>
+              <a:t>Cards</a:t>
+            </a:r>
+            <a:r>
+              <a:rPr lang="en-SG" sz="1400" dirty="0">
+                <a:solidFill>
+                  <a:schemeClr val="tx1"/>
+                </a:solidFill>
+                <a:effectLst>
+                  <a:outerShdw blurRad="38100" dist="38100" dir="2700000" algn="tl">
+                    <a:srgbClr val="000000">
+                      <a:alpha val="43137"/>
+                    </a:srgbClr>
+                  </a:outerShdw>
+                </a:effectLst>
+                <a:latin typeface="Bahnschrift Light Condensed" panose="020B0502040204020203" pitchFamily="34" charset="0"/>
+              </a:rPr>
+              <a:t> answered wrongly shown here</a:t>
+            </a:r>
+            <a:endParaRPr lang="en-SG" sz="1400" b="1" dirty="0">
+              <a:solidFill>
+                <a:schemeClr val="tx1"/>
+              </a:solidFill>
+              <a:effectLst>
+                <a:outerShdw blurRad="38100" dist="38100" dir="2700000" algn="tl">
+                  <a:srgbClr val="000000">
+                    <a:alpha val="43137"/>
+                  </a:srgbClr>
+                </a:outerShdw>
+              </a:effectLst>
+              <a:latin typeface="Bahnschrift Light Condensed" panose="020B0502040204020203" pitchFamily="34" charset="0"/>
+            </a:endParaRPr>
+          </a:p>
+        </p:txBody>
+      </p:sp>
+    </p:spTree>
+    <p:extLst>
+      <p:ext uri="{BB962C8B-B14F-4D97-AF65-F5344CB8AC3E}">
+        <p14:creationId xmlns:p14="http://schemas.microsoft.com/office/powerpoint/2010/main" val="2558258663"/>
+      </p:ext>
+    </p:extLst>
+  </p:cSld>
+  <p:clrMapOvr>
+    <a:masterClrMapping/>
+  </p:clrMapOvr>
+</p:sld>
+</file>
+
+<file path=ppt/slides/slide7.xml><?xml version="1.0" encoding="utf-8"?>
+<p:sld xmlns:a="http://schemas.openxmlformats.org/drawingml/2006/main" xmlns:r="http://schemas.openxmlformats.org/officeDocument/2006/relationships" xmlns:p="http://schemas.openxmlformats.org/presentationml/2006/main">
+  <p:cSld>
+    <p:spTree>
+      <p:nvGrpSpPr>
+        <p:cNvPr id="1" name=""/>
+        <p:cNvGrpSpPr/>
+        <p:nvPr/>
+      </p:nvGrpSpPr>
+      <p:grpSpPr>
+        <a:xfrm>
+          <a:off x="0" y="0"/>
+          <a:ext cx="0" cy="0"/>
+          <a:chOff x="0" y="0"/>
+          <a:chExt cx="0" cy="0"/>
+        </a:xfrm>
+      </p:grpSpPr>
+      <p:grpSp>
+        <p:nvGrpSpPr>
+          <p:cNvPr id="7" name="Group 6">
+            <a:extLst>
+              <a:ext uri="{FF2B5EF4-FFF2-40B4-BE49-F238E27FC236}">
+                <a16:creationId xmlns:a16="http://schemas.microsoft.com/office/drawing/2014/main" id="{45DED426-3C43-4D82-9555-865CCA00F127}"/>
+              </a:ext>
+            </a:extLst>
+          </p:cNvPr>
+          <p:cNvGrpSpPr/>
+          <p:nvPr/>
+        </p:nvGrpSpPr>
+        <p:grpSpPr>
+          <a:xfrm>
+            <a:off x="2977975" y="286603"/>
+            <a:ext cx="7043850" cy="6133051"/>
+            <a:chOff x="2977975" y="286603"/>
+            <a:chExt cx="7043850" cy="6133051"/>
+          </a:xfrm>
+        </p:grpSpPr>
+        <p:pic>
+          <p:nvPicPr>
+            <p:cNvPr id="4" name="Picture 3">
+              <a:extLst>
+                <a:ext uri="{FF2B5EF4-FFF2-40B4-BE49-F238E27FC236}">
+                  <a16:creationId xmlns:a16="http://schemas.microsoft.com/office/drawing/2014/main" id="{06C69A90-07D7-488D-9952-3C6D6B7A565F}"/>
+                </a:ext>
+              </a:extLst>
+            </p:cNvPr>
+            <p:cNvPicPr>
+              <a:picLocks noChangeAspect="1"/>
+            </p:cNvPicPr>
+            <p:nvPr/>
+          </p:nvPicPr>
+          <p:blipFill rotWithShape="1">
+            <a:blip r:embed="rId2"/>
+            <a:srcRect l="24437" t="4180" r="17800" b="6392"/>
+            <a:stretch/>
+          </p:blipFill>
+          <p:spPr>
+            <a:xfrm>
+              <a:off x="2979421" y="286603"/>
+              <a:ext cx="7042404" cy="6133051"/>
+            </a:xfrm>
+            <a:prstGeom prst="rect">
+              <a:avLst/>
+            </a:prstGeom>
+            <a:solidFill>
+              <a:srgbClr val="FFFFFF">
+                <a:shade val="85000"/>
+              </a:srgbClr>
+            </a:solidFill>
+            <a:ln w="88900" cap="sq">
+              <a:solidFill>
+                <a:srgbClr val="FFFFFF"/>
+              </a:solidFill>
+              <a:miter lim="800000"/>
+            </a:ln>
+            <a:effectLst>
+              <a:outerShdw blurRad="55000" dist="18000" dir="5400000" algn="tl" rotWithShape="0">
+                <a:srgbClr val="000000">
+                  <a:alpha val="40000"/>
+                </a:srgbClr>
+              </a:outerShdw>
+            </a:effectLst>
+            <a:scene3d>
+              <a:camera prst="orthographicFront"/>
+              <a:lightRig rig="twoPt" dir="t">
+                <a:rot lat="0" lon="0" rev="7200000"/>
+              </a:lightRig>
+            </a:scene3d>
+            <a:sp3d>
+              <a:bevelT w="25400" h="19050"/>
+              <a:contourClr>
+                <a:srgbClr val="FFFFFF"/>
+              </a:contourClr>
+            </a:sp3d>
+          </p:spPr>
+        </p:pic>
+        <p:sp>
+          <p:nvSpPr>
+            <p:cNvPr id="5" name="Rectangle: Rounded Corners 4">
+              <a:extLst>
+                <a:ext uri="{FF2B5EF4-FFF2-40B4-BE49-F238E27FC236}">
+                  <a16:creationId xmlns:a16="http://schemas.microsoft.com/office/drawing/2014/main" id="{0E0E444D-BFC2-4CAD-9E3F-BC56BE752500}"/>
+                </a:ext>
+              </a:extLst>
+            </p:cNvPr>
+            <p:cNvSpPr/>
+            <p:nvPr/>
+          </p:nvSpPr>
+          <p:spPr>
+            <a:xfrm>
+              <a:off x="2977975" y="1517714"/>
+              <a:ext cx="7025561" cy="782426"/>
+            </a:xfrm>
+            <a:prstGeom prst="roundRect">
+              <a:avLst/>
+            </a:prstGeom>
+            <a:noFill/>
+            <a:ln w="19050">
+              <a:solidFill>
+                <a:schemeClr val="bg2">
+                  <a:lumMod val="75000"/>
+                </a:schemeClr>
+              </a:solidFill>
+              <a:prstDash val="sysDash"/>
+            </a:ln>
+          </p:spPr>
+          <p:style>
+            <a:lnRef idx="2">
+              <a:schemeClr val="accent1">
+                <a:shade val="50000"/>
+              </a:schemeClr>
+            </a:lnRef>
+            <a:fillRef idx="1">
+              <a:schemeClr val="accent1"/>
+            </a:fillRef>
+            <a:effectRef idx="0">
+              <a:schemeClr val="accent1"/>
+            </a:effectRef>
+            <a:fontRef idx="minor">
+              <a:schemeClr val="lt1"/>
+            </a:fontRef>
+          </p:style>
+          <p:txBody>
+            <a:bodyPr rtlCol="0" anchor="ctr"/>
+            <a:lstStyle/>
+            <a:p>
+              <a:pPr algn="ctr"/>
+              <a:endParaRPr lang="en-SG" dirty="0"/>
+            </a:p>
+          </p:txBody>
+        </p:sp>
+        <p:sp>
+          <p:nvSpPr>
+            <p:cNvPr id="6" name="Rectangle: Rounded Corners 5">
+              <a:extLst>
+                <a:ext uri="{FF2B5EF4-FFF2-40B4-BE49-F238E27FC236}">
+                  <a16:creationId xmlns:a16="http://schemas.microsoft.com/office/drawing/2014/main" id="{830CE4AE-0457-4742-A9B0-7D5195B14D99}"/>
+                </a:ext>
+              </a:extLst>
+            </p:cNvPr>
+            <p:cNvSpPr/>
+            <p:nvPr/>
+          </p:nvSpPr>
+          <p:spPr>
+            <a:xfrm>
+              <a:off x="7652931" y="1236183"/>
+              <a:ext cx="2259244" cy="532399"/>
+            </a:xfrm>
+            <a:prstGeom prst="roundRect">
+              <a:avLst/>
+            </a:prstGeom>
+            <a:gradFill flip="none" rotWithShape="1">
+              <a:gsLst>
+                <a:gs pos="0">
+                  <a:schemeClr val="bg2">
+                    <a:lumMod val="90000"/>
+                    <a:tint val="66000"/>
+                    <a:satMod val="160000"/>
+                  </a:schemeClr>
+                </a:gs>
+                <a:gs pos="50000">
+                  <a:schemeClr val="bg2">
+                    <a:lumMod val="90000"/>
+                    <a:tint val="44500"/>
+                    <a:satMod val="160000"/>
+                  </a:schemeClr>
+                </a:gs>
+                <a:gs pos="100000">
+                  <a:schemeClr val="bg2">
+                    <a:lumMod val="90000"/>
+                    <a:tint val="23500"/>
+                    <a:satMod val="160000"/>
+                  </a:schemeClr>
+                </a:gs>
+              </a:gsLst>
+              <a:lin ang="8100000" scaled="1"/>
+              <a:tileRect/>
+            </a:gradFill>
+            <a:ln>
+              <a:solidFill>
+                <a:schemeClr val="bg2">
+                  <a:lumMod val="50000"/>
+                </a:schemeClr>
+              </a:solidFill>
+            </a:ln>
+          </p:spPr>
+          <p:style>
+            <a:lnRef idx="2">
+              <a:schemeClr val="accent1">
+                <a:shade val="50000"/>
+              </a:schemeClr>
+            </a:lnRef>
+            <a:fillRef idx="1">
+              <a:schemeClr val="accent1"/>
+            </a:fillRef>
+            <a:effectRef idx="0">
+              <a:schemeClr val="accent1"/>
+            </a:effectRef>
+            <a:fontRef idx="minor">
+              <a:schemeClr val="lt1"/>
+            </a:fontRef>
+          </p:style>
+          <p:txBody>
+            <a:bodyPr rtlCol="0" anchor="ctr"/>
+            <a:lstStyle/>
+            <a:p>
+              <a:pPr algn="ctr"/>
+              <a:r>
+                <a:rPr lang="en-SG" sz="1400" dirty="0">
+                  <a:solidFill>
+                    <a:schemeClr val="tx1"/>
+                  </a:solidFill>
+                  <a:effectLst>
+                    <a:outerShdw blurRad="38100" dist="38100" dir="2700000" algn="tl">
+                      <a:srgbClr val="000000">
+                        <a:alpha val="43137"/>
+                      </a:srgbClr>
+                    </a:outerShdw>
+                  </a:effectLst>
+                  <a:latin typeface="Bahnschrift Light Condensed" panose="020B0502040204020203" pitchFamily="34" charset="0"/>
+                </a:rPr>
+                <a:t>Feedback when </a:t>
+              </a:r>
+              <a:r>
+                <a:rPr lang="en-SG" sz="1400" b="1" dirty="0">
+                  <a:solidFill>
+                    <a:schemeClr val="tx1"/>
+                  </a:solidFill>
+                  <a:effectLst>
+                    <a:outerShdw blurRad="38100" dist="38100" dir="2700000" algn="tl">
+                      <a:srgbClr val="000000">
+                        <a:alpha val="43137"/>
+                      </a:srgbClr>
+                    </a:outerShdw>
+                  </a:effectLst>
+                  <a:latin typeface="Bahnschrift Light Condensed" panose="020B0502040204020203" pitchFamily="34" charset="0"/>
+                </a:rPr>
+                <a:t>Game</a:t>
+              </a:r>
+            </a:p>
+            <a:p>
+              <a:pPr algn="ctr"/>
+              <a:r>
+                <a:rPr lang="en-SG" sz="1400" b="1" dirty="0">
+                  <a:solidFill>
+                    <a:schemeClr val="tx1"/>
+                  </a:solidFill>
+                  <a:effectLst>
+                    <a:outerShdw blurRad="38100" dist="38100" dir="2700000" algn="tl">
+                      <a:srgbClr val="000000">
+                        <a:alpha val="43137"/>
+                      </a:srgbClr>
+                    </a:outerShdw>
+                  </a:effectLst>
+                  <a:latin typeface="Bahnschrift Light Condensed" panose="020B0502040204020203" pitchFamily="34" charset="0"/>
+                </a:rPr>
+                <a:t> </a:t>
+              </a:r>
+              <a:r>
+                <a:rPr lang="en-SG" sz="1400" dirty="0">
+                  <a:solidFill>
+                    <a:schemeClr val="tx1"/>
+                  </a:solidFill>
+                  <a:effectLst>
+                    <a:outerShdw blurRad="38100" dist="38100" dir="2700000" algn="tl">
+                      <a:srgbClr val="000000">
+                        <a:alpha val="43137"/>
+                      </a:srgbClr>
+                    </a:outerShdw>
+                  </a:effectLst>
+                  <a:latin typeface="Bahnschrift Light Condensed" panose="020B0502040204020203" pitchFamily="34" charset="0"/>
+                </a:rPr>
+                <a:t>is stopped</a:t>
+              </a:r>
+            </a:p>
+          </p:txBody>
+        </p:sp>
+      </p:grpSp>
+    </p:spTree>
+    <p:extLst>
+      <p:ext uri="{BB962C8B-B14F-4D97-AF65-F5344CB8AC3E}">
+        <p14:creationId xmlns:p14="http://schemas.microsoft.com/office/powerpoint/2010/main" val="1795090436"/>
+      </p:ext>
+    </p:extLst>
+  </p:cSld>
+  <p:clrMapOvr>
+    <a:masterClrMapping/>
+  </p:clrMapOvr>
+</p:sld>
+</file>
+
 <file path=ppt/theme/theme1.xml><?xml version="1.0" encoding="utf-8"?>
 <a:theme xmlns:a="http://schemas.openxmlformats.org/drawingml/2006/main" name="Retrospect">
   <a:themeElements>

</xml_diff>

<commit_message>
Wrapping up for v1.3 Release
</commit_message>
<xml_diff>
--- a/docs/diagrams/powerpoint/User Guide Diagrams.pptx
+++ b/docs/diagrams/powerpoint/User Guide Diagrams.pptx
@@ -5,7 +5,7 @@
     <p:sldMasterId id="2147483761" r:id="rId1"/>
   </p:sldMasterIdLst>
   <p:notesMasterIdLst>
-    <p:notesMasterId r:id="rId9"/>
+    <p:notesMasterId r:id="rId10"/>
   </p:notesMasterIdLst>
   <p:sldIdLst>
     <p:sldId id="256" r:id="rId2"/>
@@ -15,6 +15,7 @@
     <p:sldId id="260" r:id="rId6"/>
     <p:sldId id="261" r:id="rId7"/>
     <p:sldId id="262" r:id="rId8"/>
+    <p:sldId id="263" r:id="rId9"/>
   </p:sldIdLst>
   <p:sldSz cx="12192000" cy="6858000"/>
   <p:notesSz cx="6858000" cy="9144000"/>
@@ -1057,6 +1058,93 @@
     <p:extLst>
       <p:ext uri="{BB962C8B-B14F-4D97-AF65-F5344CB8AC3E}">
         <p14:creationId xmlns:p14="http://schemas.microsoft.com/office/powerpoint/2010/main" val="2530896308"/>
+      </p:ext>
+    </p:extLst>
+  </p:cSld>
+  <p:clrMapOvr>
+    <a:masterClrMapping/>
+  </p:clrMapOvr>
+</p:notes>
+</file>
+
+<file path=ppt/notesSlides/notesSlide7.xml><?xml version="1.0" encoding="utf-8"?>
+<p:notes xmlns:a="http://schemas.openxmlformats.org/drawingml/2006/main" xmlns:r="http://schemas.openxmlformats.org/officeDocument/2006/relationships" xmlns:p="http://schemas.openxmlformats.org/presentationml/2006/main">
+  <p:cSld>
+    <p:spTree>
+      <p:nvGrpSpPr>
+        <p:cNvPr id="1" name=""/>
+        <p:cNvGrpSpPr/>
+        <p:nvPr/>
+      </p:nvGrpSpPr>
+      <p:grpSpPr>
+        <a:xfrm>
+          <a:off x="0" y="0"/>
+          <a:ext cx="0" cy="0"/>
+          <a:chOff x="0" y="0"/>
+          <a:chExt cx="0" cy="0"/>
+        </a:xfrm>
+      </p:grpSpPr>
+      <p:sp>
+        <p:nvSpPr>
+          <p:cNvPr id="2" name="Slide Image Placeholder 1"/>
+          <p:cNvSpPr>
+            <a:spLocks noGrp="1" noRot="1" noChangeAspect="1"/>
+          </p:cNvSpPr>
+          <p:nvPr>
+            <p:ph type="sldImg"/>
+          </p:nvPr>
+        </p:nvSpPr>
+        <p:spPr/>
+      </p:sp>
+      <p:sp>
+        <p:nvSpPr>
+          <p:cNvPr id="3" name="Notes Placeholder 2"/>
+          <p:cNvSpPr>
+            <a:spLocks noGrp="1"/>
+          </p:cNvSpPr>
+          <p:nvPr>
+            <p:ph type="body" idx="1"/>
+          </p:nvPr>
+        </p:nvSpPr>
+        <p:spPr/>
+        <p:txBody>
+          <a:bodyPr/>
+          <a:lstStyle/>
+          <a:p>
+            <a:r>
+              <a:rPr lang="en-SG" dirty="0"/>
+              <a:t>UI Pic</a:t>
+            </a:r>
+          </a:p>
+        </p:txBody>
+      </p:sp>
+      <p:sp>
+        <p:nvSpPr>
+          <p:cNvPr id="4" name="Slide Number Placeholder 3"/>
+          <p:cNvSpPr>
+            <a:spLocks noGrp="1"/>
+          </p:cNvSpPr>
+          <p:nvPr>
+            <p:ph type="sldNum" sz="quarter" idx="5"/>
+          </p:nvPr>
+        </p:nvSpPr>
+        <p:spPr/>
+        <p:txBody>
+          <a:bodyPr/>
+          <a:lstStyle/>
+          <a:p>
+            <a:fld id="{0FCAFDEF-04E4-4E08-87E8-ABCCC2F47D5C}" type="slidenum">
+              <a:rPr lang="en-SG" smtClean="0"/>
+              <a:t>8</a:t>
+            </a:fld>
+            <a:endParaRPr lang="en-SG"/>
+          </a:p>
+        </p:txBody>
+      </p:sp>
+    </p:spTree>
+    <p:extLst>
+      <p:ext uri="{BB962C8B-B14F-4D97-AF65-F5344CB8AC3E}">
+        <p14:creationId xmlns:p14="http://schemas.microsoft.com/office/powerpoint/2010/main" val="3724162855"/>
       </p:ext>
     </p:extLst>
   </p:cSld>
@@ -13284,6 +13372,125 @@
 </p:sld>
 </file>
 
+<file path=ppt/slides/slide8.xml><?xml version="1.0" encoding="utf-8"?>
+<p:sld xmlns:a="http://schemas.openxmlformats.org/drawingml/2006/main" xmlns:r="http://schemas.openxmlformats.org/officeDocument/2006/relationships" xmlns:p="http://schemas.openxmlformats.org/presentationml/2006/main">
+  <p:cSld>
+    <p:spTree>
+      <p:nvGrpSpPr>
+        <p:cNvPr id="1" name=""/>
+        <p:cNvGrpSpPr/>
+        <p:nvPr/>
+      </p:nvGrpSpPr>
+      <p:grpSpPr>
+        <a:xfrm>
+          <a:off x="0" y="0"/>
+          <a:ext cx="0" cy="0"/>
+          <a:chOff x="0" y="0"/>
+          <a:chExt cx="0" cy="0"/>
+        </a:xfrm>
+      </p:grpSpPr>
+      <p:sp>
+        <p:nvSpPr>
+          <p:cNvPr id="2" name="Title 1">
+            <a:extLst>
+              <a:ext uri="{FF2B5EF4-FFF2-40B4-BE49-F238E27FC236}">
+                <a16:creationId xmlns:a16="http://schemas.microsoft.com/office/drawing/2014/main" id="{E70CC326-E048-4666-92D1-EE93F81C75B2}"/>
+              </a:ext>
+            </a:extLst>
+          </p:cNvPr>
+          <p:cNvSpPr>
+            <a:spLocks noGrp="1"/>
+          </p:cNvSpPr>
+          <p:nvPr>
+            <p:ph type="title"/>
+          </p:nvPr>
+        </p:nvSpPr>
+        <p:spPr/>
+        <p:txBody>
+          <a:bodyPr/>
+          <a:lstStyle/>
+          <a:p>
+            <a:endParaRPr lang="en-SG"/>
+          </a:p>
+        </p:txBody>
+      </p:sp>
+      <p:sp>
+        <p:nvSpPr>
+          <p:cNvPr id="3" name="Content Placeholder 2">
+            <a:extLst>
+              <a:ext uri="{FF2B5EF4-FFF2-40B4-BE49-F238E27FC236}">
+                <a16:creationId xmlns:a16="http://schemas.microsoft.com/office/drawing/2014/main" id="{017416C7-AE5F-48DD-91E0-161486727C52}"/>
+              </a:ext>
+            </a:extLst>
+          </p:cNvPr>
+          <p:cNvSpPr>
+            <a:spLocks noGrp="1"/>
+          </p:cNvSpPr>
+          <p:nvPr>
+            <p:ph idx="1"/>
+          </p:nvPr>
+        </p:nvSpPr>
+        <p:spPr/>
+        <p:txBody>
+          <a:bodyPr/>
+          <a:lstStyle/>
+          <a:p>
+            <a:endParaRPr lang="en-SG"/>
+          </a:p>
+        </p:txBody>
+      </p:sp>
+      <p:pic>
+        <p:nvPicPr>
+          <p:cNvPr id="9" name="Picture 8">
+            <a:extLst>
+              <a:ext uri="{FF2B5EF4-FFF2-40B4-BE49-F238E27FC236}">
+                <a16:creationId xmlns:a16="http://schemas.microsoft.com/office/drawing/2014/main" id="{751EE8B3-8063-4B95-BBDD-243173A28F1E}"/>
+              </a:ext>
+            </a:extLst>
+          </p:cNvPr>
+          <p:cNvPicPr>
+            <a:picLocks noChangeAspect="1"/>
+          </p:cNvPicPr>
+          <p:nvPr/>
+        </p:nvPicPr>
+        <p:blipFill rotWithShape="1">
+          <a:blip r:embed="rId3"/>
+          <a:srcRect t="2400" b="5333"/>
+          <a:stretch/>
+        </p:blipFill>
+        <p:spPr>
+          <a:xfrm>
+            <a:off x="0" y="164592"/>
+            <a:ext cx="12192000" cy="6327648"/>
+          </a:xfrm>
+          <a:prstGeom prst="rect">
+            <a:avLst/>
+          </a:prstGeom>
+          <a:ln>
+            <a:noFill/>
+          </a:ln>
+          <a:effectLst>
+            <a:outerShdw blurRad="190500" algn="tl" rotWithShape="0">
+              <a:srgbClr val="000000">
+                <a:alpha val="70000"/>
+              </a:srgbClr>
+            </a:outerShdw>
+          </a:effectLst>
+        </p:spPr>
+      </p:pic>
+    </p:spTree>
+    <p:extLst>
+      <p:ext uri="{BB962C8B-B14F-4D97-AF65-F5344CB8AC3E}">
+        <p14:creationId xmlns:p14="http://schemas.microsoft.com/office/powerpoint/2010/main" val="965872846"/>
+      </p:ext>
+    </p:extLst>
+  </p:cSld>
+  <p:clrMapOvr>
+    <a:masterClrMapping/>
+  </p:clrMapOvr>
+</p:sld>
+</file>
+
 <file path=ppt/theme/theme1.xml><?xml version="1.0" encoding="utf-8"?>
 <a:theme xmlns:a="http://schemas.openxmlformats.org/drawingml/2006/main" name="Retrospect">
   <a:themeElements>

</xml_diff>